<commit_message>
updated poster with new charts
</commit_message>
<xml_diff>
--- a/src/test/Parallel Poster.pptx
+++ b/src/test/Parallel Poster.pptx
@@ -197,7 +197,7 @@
           <a:p>
             <a:fld id="{D363F016-229C-42C1-BB9A-17D109E00F9E}" type="datetimeFigureOut">
               <a:rPr lang="en-US" smtClean="0"/>
-              <a:t>4/15/2018</a:t>
+              <a:t>4/17/2018</a:t>
             </a:fld>
             <a:endParaRPr lang="en-US"/>
           </a:p>
@@ -684,7 +684,7 @@
           <a:p>
             <a:fld id="{651A4ED9-8B4C-0648-9464-DB0F494C2DC2}" type="datetimeFigureOut">
               <a:rPr lang="en-US" smtClean="0"/>
-              <a:t>4/15/2018</a:t>
+              <a:t>4/17/2018</a:t>
             </a:fld>
             <a:endParaRPr lang="en-US"/>
           </a:p>
@@ -854,7 +854,7 @@
           <a:p>
             <a:fld id="{651A4ED9-8B4C-0648-9464-DB0F494C2DC2}" type="datetimeFigureOut">
               <a:rPr lang="en-US" smtClean="0"/>
-              <a:t>4/15/2018</a:t>
+              <a:t>4/17/2018</a:t>
             </a:fld>
             <a:endParaRPr lang="en-US"/>
           </a:p>
@@ -1034,7 +1034,7 @@
           <a:p>
             <a:fld id="{651A4ED9-8B4C-0648-9464-DB0F494C2DC2}" type="datetimeFigureOut">
               <a:rPr lang="en-US" smtClean="0"/>
-              <a:t>4/15/2018</a:t>
+              <a:t>4/17/2018</a:t>
             </a:fld>
             <a:endParaRPr lang="en-US"/>
           </a:p>
@@ -1204,7 +1204,7 @@
           <a:p>
             <a:fld id="{651A4ED9-8B4C-0648-9464-DB0F494C2DC2}" type="datetimeFigureOut">
               <a:rPr lang="en-US" smtClean="0"/>
-              <a:t>4/15/2018</a:t>
+              <a:t>4/17/2018</a:t>
             </a:fld>
             <a:endParaRPr lang="en-US"/>
           </a:p>
@@ -1448,7 +1448,7 @@
           <a:p>
             <a:fld id="{651A4ED9-8B4C-0648-9464-DB0F494C2DC2}" type="datetimeFigureOut">
               <a:rPr lang="en-US" smtClean="0"/>
-              <a:t>4/15/2018</a:t>
+              <a:t>4/17/2018</a:t>
             </a:fld>
             <a:endParaRPr lang="en-US"/>
           </a:p>
@@ -1680,7 +1680,7 @@
           <a:p>
             <a:fld id="{651A4ED9-8B4C-0648-9464-DB0F494C2DC2}" type="datetimeFigureOut">
               <a:rPr lang="en-US" smtClean="0"/>
-              <a:t>4/15/2018</a:t>
+              <a:t>4/17/2018</a:t>
             </a:fld>
             <a:endParaRPr lang="en-US"/>
           </a:p>
@@ -2047,7 +2047,7 @@
           <a:p>
             <a:fld id="{651A4ED9-8B4C-0648-9464-DB0F494C2DC2}" type="datetimeFigureOut">
               <a:rPr lang="en-US" smtClean="0"/>
-              <a:t>4/15/2018</a:t>
+              <a:t>4/17/2018</a:t>
             </a:fld>
             <a:endParaRPr lang="en-US"/>
           </a:p>
@@ -2165,7 +2165,7 @@
           <a:p>
             <a:fld id="{651A4ED9-8B4C-0648-9464-DB0F494C2DC2}" type="datetimeFigureOut">
               <a:rPr lang="en-US" smtClean="0"/>
-              <a:t>4/15/2018</a:t>
+              <a:t>4/17/2018</a:t>
             </a:fld>
             <a:endParaRPr lang="en-US"/>
           </a:p>
@@ -2260,7 +2260,7 @@
           <a:p>
             <a:fld id="{651A4ED9-8B4C-0648-9464-DB0F494C2DC2}" type="datetimeFigureOut">
               <a:rPr lang="en-US" smtClean="0"/>
-              <a:t>4/15/2018</a:t>
+              <a:t>4/17/2018</a:t>
             </a:fld>
             <a:endParaRPr lang="en-US"/>
           </a:p>
@@ -2537,7 +2537,7 @@
           <a:p>
             <a:fld id="{651A4ED9-8B4C-0648-9464-DB0F494C2DC2}" type="datetimeFigureOut">
               <a:rPr lang="en-US" smtClean="0"/>
-              <a:t>4/15/2018</a:t>
+              <a:t>4/17/2018</a:t>
             </a:fld>
             <a:endParaRPr lang="en-US"/>
           </a:p>
@@ -2794,7 +2794,7 @@
           <a:p>
             <a:fld id="{651A4ED9-8B4C-0648-9464-DB0F494C2DC2}" type="datetimeFigureOut">
               <a:rPr lang="en-US" smtClean="0"/>
-              <a:t>4/15/2018</a:t>
+              <a:t>4/17/2018</a:t>
             </a:fld>
             <a:endParaRPr lang="en-US"/>
           </a:p>
@@ -3007,7 +3007,7 @@
           <a:p>
             <a:fld id="{651A4ED9-8B4C-0648-9464-DB0F494C2DC2}" type="datetimeFigureOut">
               <a:rPr lang="en-US" smtClean="0"/>
-              <a:t>4/15/2018</a:t>
+              <a:t>4/17/2018</a:t>
             </a:fld>
             <a:endParaRPr lang="en-US"/>
           </a:p>
@@ -3594,8 +3594,8 @@
         </p:nvSpPr>
         <p:spPr>
           <a:xfrm>
-            <a:off x="11329286" y="10601643"/>
-            <a:ext cx="16954014" cy="7278916"/>
+            <a:off x="11375134" y="10059049"/>
+            <a:ext cx="16954014" cy="8032968"/>
           </a:xfrm>
           <a:prstGeom prst="rect">
             <a:avLst/>
@@ -3622,8 +3622,13 @@
           <a:p>
             <a:r>
               <a:rPr lang="en-US" sz="4900" dirty="0"/>
-              <a:t>We were able to get some speed up on our parallel versus our serial implementation; however, we were not able to achieve perfect scaling on our parallel implementation. So if we increase the thread count by two we do not see a double in the performance. We were expecting to see an improvement on the rate of decrease of the average fitness on the parallel version since it is doing more work in the same amount of time, but that did not really happen. </a:t>
-            </a:r>
+              <a:t>We were able to get some speed up on our parallel versus our serial implementation; however, we were not able to achieve perfect scaling on our parallel implementation. So if we increase the thread count by two we do not see a double in the performance. We were expecting to observe an improvement on the rate of decrease of the average fitness on the parallel version since it is doing more work in the same amount of time, that was not actually observed. Most likely due to the algorithm solving 29 cities in shirt amount of </a:t>
+            </a:r>
+            <a:r>
+              <a:rPr lang="en-US" sz="4900"/>
+              <a:t>time.</a:t>
+            </a:r>
+            <a:endParaRPr lang="en-US" sz="4900" dirty="0"/>
           </a:p>
         </p:txBody>
       </p:sp>
@@ -3658,8 +3663,8 @@
         </p:blipFill>
         <p:spPr>
           <a:xfrm>
-            <a:off x="123569" y="2276137"/>
-            <a:ext cx="11375136" cy="8540614"/>
+            <a:off x="123570" y="2276137"/>
+            <a:ext cx="11375134" cy="8540614"/>
           </a:xfrm>
           <a:prstGeom prst="rect">
             <a:avLst/>
@@ -3698,7 +3703,7 @@
         <p:spPr>
           <a:xfrm>
             <a:off x="0" y="10583762"/>
-            <a:ext cx="11375134" cy="8540614"/>
+            <a:ext cx="11375134" cy="8540613"/>
           </a:xfrm>
           <a:prstGeom prst="rect">
             <a:avLst/>
@@ -3737,7 +3742,7 @@
         <p:spPr>
           <a:xfrm>
             <a:off x="61785" y="18891387"/>
-            <a:ext cx="11375134" cy="8540614"/>
+            <a:ext cx="11375134" cy="8540613"/>
           </a:xfrm>
           <a:prstGeom prst="rect">
             <a:avLst/>
@@ -3847,8 +3852,8 @@
         </p:blipFill>
         <p:spPr>
           <a:xfrm>
-            <a:off x="11884714" y="17704263"/>
-            <a:ext cx="15384656" cy="9470462"/>
+            <a:off x="13270248" y="17961538"/>
+            <a:ext cx="12613587" cy="9470462"/>
           </a:xfrm>
           <a:prstGeom prst="rect">
             <a:avLst/>
@@ -3870,7 +3875,7 @@
         <p:spPr>
           <a:xfrm>
             <a:off x="28541429" y="10813102"/>
-            <a:ext cx="7849215" cy="6524863"/>
+            <a:ext cx="7849215" cy="7278916"/>
           </a:xfrm>
           <a:prstGeom prst="rect">
             <a:avLst/>
@@ -3892,7 +3897,7 @@
           <a:p>
             <a:r>
               <a:rPr lang="en-US" sz="4900" dirty="0"/>
-              <a:t>Optimize the code further to improve the parallel scaling. Test the algorithm for a longer period of time to see if the parallel version is able to achieve a much lower average fitness over the serial version.  </a:t>
+              <a:t>Optimize the code further to improve the parallel scaling. Test the algorithm for a longer period of time and on a larger city size, to see if the parallel version is able to achieve a much lower average fitness over the serial version.  </a:t>
             </a:r>
           </a:p>
         </p:txBody>

</xml_diff>